<commit_message>
minor changes in the presentation
</commit_message>
<xml_diff>
--- a/Simulatoare.pptx
+++ b/Simulatoare.pptx
@@ -269,7 +269,7 @@
           <a:p>
             <a:fld id="{F8115C22-6DFE-4BA3-BC18-D1C9DD274FD0}" type="datetimeFigureOut">
               <a:rPr lang="en-US" smtClean="0"/>
-              <a:t>5/24/2021</a:t>
+              <a:t>24-May-21</a:t>
             </a:fld>
             <a:endParaRPr lang="en-US"/>
           </a:p>
@@ -469,7 +469,7 @@
           <a:p>
             <a:fld id="{F8115C22-6DFE-4BA3-BC18-D1C9DD274FD0}" type="datetimeFigureOut">
               <a:rPr lang="en-US" smtClean="0"/>
-              <a:t>5/24/2021</a:t>
+              <a:t>24-May-21</a:t>
             </a:fld>
             <a:endParaRPr lang="en-US"/>
           </a:p>
@@ -679,7 +679,7 @@
           <a:p>
             <a:fld id="{F8115C22-6DFE-4BA3-BC18-D1C9DD274FD0}" type="datetimeFigureOut">
               <a:rPr lang="en-US" smtClean="0"/>
-              <a:t>5/24/2021</a:t>
+              <a:t>24-May-21</a:t>
             </a:fld>
             <a:endParaRPr lang="en-US"/>
           </a:p>
@@ -879,7 +879,7 @@
           <a:p>
             <a:fld id="{F8115C22-6DFE-4BA3-BC18-D1C9DD274FD0}" type="datetimeFigureOut">
               <a:rPr lang="en-US" smtClean="0"/>
-              <a:t>5/24/2021</a:t>
+              <a:t>24-May-21</a:t>
             </a:fld>
             <a:endParaRPr lang="en-US"/>
           </a:p>
@@ -1155,7 +1155,7 @@
           <a:p>
             <a:fld id="{F8115C22-6DFE-4BA3-BC18-D1C9DD274FD0}" type="datetimeFigureOut">
               <a:rPr lang="en-US" smtClean="0"/>
-              <a:t>5/24/2021</a:t>
+              <a:t>24-May-21</a:t>
             </a:fld>
             <a:endParaRPr lang="en-US"/>
           </a:p>
@@ -1423,7 +1423,7 @@
           <a:p>
             <a:fld id="{F8115C22-6DFE-4BA3-BC18-D1C9DD274FD0}" type="datetimeFigureOut">
               <a:rPr lang="en-US" smtClean="0"/>
-              <a:t>5/24/2021</a:t>
+              <a:t>24-May-21</a:t>
             </a:fld>
             <a:endParaRPr lang="en-US"/>
           </a:p>
@@ -1838,7 +1838,7 @@
           <a:p>
             <a:fld id="{F8115C22-6DFE-4BA3-BC18-D1C9DD274FD0}" type="datetimeFigureOut">
               <a:rPr lang="en-US" smtClean="0"/>
-              <a:t>5/24/2021</a:t>
+              <a:t>24-May-21</a:t>
             </a:fld>
             <a:endParaRPr lang="en-US"/>
           </a:p>
@@ -1980,7 +1980,7 @@
           <a:p>
             <a:fld id="{F8115C22-6DFE-4BA3-BC18-D1C9DD274FD0}" type="datetimeFigureOut">
               <a:rPr lang="en-US" smtClean="0"/>
-              <a:t>5/24/2021</a:t>
+              <a:t>24-May-21</a:t>
             </a:fld>
             <a:endParaRPr lang="en-US"/>
           </a:p>
@@ -2093,7 +2093,7 @@
           <a:p>
             <a:fld id="{F8115C22-6DFE-4BA3-BC18-D1C9DD274FD0}" type="datetimeFigureOut">
               <a:rPr lang="en-US" smtClean="0"/>
-              <a:t>5/24/2021</a:t>
+              <a:t>24-May-21</a:t>
             </a:fld>
             <a:endParaRPr lang="en-US"/>
           </a:p>
@@ -2406,7 +2406,7 @@
           <a:p>
             <a:fld id="{F8115C22-6DFE-4BA3-BC18-D1C9DD274FD0}" type="datetimeFigureOut">
               <a:rPr lang="en-US" smtClean="0"/>
-              <a:t>5/24/2021</a:t>
+              <a:t>24-May-21</a:t>
             </a:fld>
             <a:endParaRPr lang="en-US"/>
           </a:p>
@@ -2695,7 +2695,7 @@
           <a:p>
             <a:fld id="{F8115C22-6DFE-4BA3-BC18-D1C9DD274FD0}" type="datetimeFigureOut">
               <a:rPr lang="en-US" smtClean="0"/>
-              <a:t>5/24/2021</a:t>
+              <a:t>24-May-21</a:t>
             </a:fld>
             <a:endParaRPr lang="en-US"/>
           </a:p>
@@ -2938,7 +2938,7 @@
           <a:p>
             <a:fld id="{F8115C22-6DFE-4BA3-BC18-D1C9DD274FD0}" type="datetimeFigureOut">
               <a:rPr lang="en-US" smtClean="0"/>
-              <a:t>5/24/2021</a:t>
+              <a:t>24-May-21</a:t>
             </a:fld>
             <a:endParaRPr lang="en-US"/>
           </a:p>
@@ -3578,7 +3578,7 @@
                   </a:schemeClr>
                 </a:solidFill>
               </a:rPr>
-              <a:t>        profesor coordonator: Lupa Nicolae</a:t>
+              <a:t>        profesor coordonator: Dr Prof Lupa Nicolae</a:t>
             </a:r>
           </a:p>
           <a:p>
@@ -5871,6 +5871,7 @@
           </a:bodyPr>
           <a:lstStyle/>
           <a:p>
+            <a:pPr algn="ctr"/>
             <a:r>
               <a:rPr lang="ro-RO" sz="1800" cap="none" spc="0" dirty="0">
                 <a:ln w="13462">
@@ -5888,6 +5889,22 @@
               </a:rPr>
               <a:t>FIG. 3 – SIMULAREA DISTRIBUȚIEI EXPONENȚIALE PENTRU </a:t>
             </a:r>
+            <a:br>
+              <a:rPr lang="ro-RO" sz="1800" cap="none" spc="0" dirty="0">
+                <a:ln w="13462">
+                  <a:solidFill>
+                    <a:schemeClr val="bg1"/>
+                  </a:solidFill>
+                  <a:prstDash val="solid"/>
+                </a:ln>
+                <a:solidFill>
+                  <a:schemeClr val="bg1">
+                    <a:lumMod val="95000"/>
+                  </a:schemeClr>
+                </a:solidFill>
+                <a:latin typeface="Abadi Extra Light" panose="020B0204020104020204" pitchFamily="34" charset="0"/>
+              </a:rPr>
+            </a:br>
             <a:r>
               <a:rPr lang="el-GR" b="0" i="0" dirty="0">
                 <a:solidFill>

</xml_diff>